<commit_message>
updated title slide description.
</commit_message>
<xml_diff>
--- a/Introduction to Git.pptx
+++ b/Introduction to Git.pptx
@@ -6349,7 +6349,11 @@
           <a:p>
             <a:r>
               <a:rPr lang="en-US" dirty="0" smtClean="0"/>
-              <a:t>An Introduction</a:t>
+              <a:t>A fearless adventure into </a:t>
+            </a:r>
+            <a:r>
+              <a:rPr lang="en-US" smtClean="0"/>
+              <a:t>revision control.</a:t>
             </a:r>
             <a:endParaRPr lang="en-US" dirty="0"/>
           </a:p>

</xml_diff>